<commit_message>
slight correction to presentation
</commit_message>
<xml_diff>
--- a/ME EN 6960_Group4_Exp3_Final.pptx
+++ b/ME EN 6960_Group4_Exp3_Final.pptx
@@ -7525,11 +7525,6 @@
               <a:rPr lang="en-US" dirty="0"/>
               <a:t>In 1914, Hopkinson introduced a technique for measuring dynamic material strength</a:t>
             </a:r>
-            <a:r>
-              <a:rPr lang="en-US" sz="1400" dirty="0"/>
-              <a:t> ]4]</a:t>
-            </a:r>
-            <a:endParaRPr lang="en-US" dirty="0"/>
           </a:p>
           <a:p>
             <a:pPr marL="1200150" lvl="2" indent="-285750">
@@ -7558,13 +7553,8 @@
             </a:pPr>
             <a:r>
               <a:rPr lang="en-US" dirty="0"/>
-              <a:t>In 1948, Davies did a critical review of this experimental technique </a:t>
-            </a:r>
-            <a:r>
-              <a:rPr lang="en-US" sz="1400" dirty="0"/>
-              <a:t>[5]</a:t>
-            </a:r>
-            <a:endParaRPr lang="en-US" dirty="0"/>
+              <a:t>In 1948, Davies did a critical review of this experimental technique</a:t>
+            </a:r>
           </a:p>
           <a:p>
             <a:pPr marL="1200150" lvl="2" indent="-285750">

</xml_diff>